<commit_message>
Replace uppercase with lowercase.
</commit_message>
<xml_diff>
--- a/ModernFortran.f10/20210724_リファクタリング.pptx
+++ b/ModernFortran.f10/20210724_リファクタリング.pptx
@@ -19296,15 +19296,75 @@
             <p:ph type="body" idx="1"/>
           </p:nvPr>
         </p:nvSpPr>
-        <p:spPr/>
+        <p:spPr>
+          <a:xfrm>
+            <a:off x="838200" y="995423"/>
+            <a:ext cx="5257800" cy="5181540"/>
+          </a:xfrm>
+        </p:spPr>
         <p:txBody>
           <a:bodyPr/>
           <a:lstStyle/>
           <a:p>
-            <a:endParaRPr lang="ja-JP" altLang="en-US"/>
+            <a:r>
+              <a:rPr lang="en-US" altLang="ja-JP" dirty="0"/>
+              <a:t>IF</a:t>
+            </a:r>
+            <a:r>
+              <a:rPr lang="ja-JP" altLang="en-US" dirty="0"/>
+              <a:t>、</a:t>
+            </a:r>
+            <a:r>
+              <a:rPr lang="en-US" altLang="ja-JP" dirty="0"/>
+              <a:t>DO</a:t>
+            </a:r>
+            <a:r>
+              <a:rPr lang="ja-JP" altLang="en-US" dirty="0"/>
+              <a:t>などを小文字に置き換える。</a:t>
+            </a:r>
+            <a:endParaRPr lang="en-US" altLang="ja-JP" dirty="0"/>
+          </a:p>
+          <a:p>
+            <a:endParaRPr lang="en-US" altLang="ja-JP" dirty="0"/>
+          </a:p>
+          <a:p>
+            <a:r>
+              <a:rPr lang="ja-JP" altLang="en-US" dirty="0"/>
+              <a:t>コメントやメッセージなどを置換でひっかけないように気を付ける。</a:t>
+            </a:r>
           </a:p>
         </p:txBody>
       </p:sp>
+      <p:pic>
+        <p:nvPicPr>
+          <p:cNvPr id="3" name="図 2">
+            <a:extLst>
+              <a:ext uri="{FF2B5EF4-FFF2-40B4-BE49-F238E27FC236}">
+                <a16:creationId xmlns:a16="http://schemas.microsoft.com/office/drawing/2014/main" id="{93D7A396-9D4F-4C33-A25B-DDCBC5530C00}"/>
+              </a:ext>
+            </a:extLst>
+          </p:cNvPr>
+          <p:cNvPicPr>
+            <a:picLocks noChangeAspect="1"/>
+          </p:cNvPicPr>
+          <p:nvPr/>
+        </p:nvPicPr>
+        <p:blipFill>
+          <a:blip r:embed="rId2"/>
+          <a:stretch>
+            <a:fillRect/>
+          </a:stretch>
+        </p:blipFill>
+        <p:spPr>
+          <a:xfrm>
+            <a:off x="6629397" y="1534739"/>
+            <a:ext cx="5287113" cy="3600953"/>
+          </a:xfrm>
+          <a:prstGeom prst="rect">
+            <a:avLst/>
+          </a:prstGeom>
+        </p:spPr>
+      </p:pic>
     </p:spTree>
     <p:extLst>
       <p:ext uri="{BB962C8B-B14F-4D97-AF65-F5344CB8AC3E}">

</xml_diff>

<commit_message>
Replace write(*,*) to print(with read(*,*) to read *,)
</commit_message>
<xml_diff>
--- a/ModernFortran.f10/20210724_リファクタリング.pptx
+++ b/ModernFortran.f10/20210724_リファクタリング.pptx
@@ -19444,15 +19444,63 @@
             <p:ph type="body" idx="1"/>
           </p:nvPr>
         </p:nvSpPr>
-        <p:spPr/>
+        <p:spPr>
+          <a:xfrm>
+            <a:off x="838200" y="995423"/>
+            <a:ext cx="5386754" cy="5181540"/>
+          </a:xfrm>
+        </p:spPr>
         <p:txBody>
           <a:bodyPr/>
           <a:lstStyle/>
           <a:p>
-            <a:endParaRPr lang="ja-JP" altLang="en-US"/>
+            <a:r>
+              <a:rPr lang="ja-JP" altLang="en-US" dirty="0"/>
+              <a:t>これは作業ではないけれど、重要なので気を付ける。</a:t>
+            </a:r>
+            <a:endParaRPr lang="en-US" altLang="ja-JP" dirty="0"/>
+          </a:p>
+          <a:p>
+            <a:endParaRPr lang="en-US" altLang="ja-JP" dirty="0"/>
+          </a:p>
+          <a:p>
+            <a:r>
+              <a:rPr lang="ja-JP" altLang="en-US" dirty="0"/>
+              <a:t>うかつに書き換えると動かなくなるので、ここでは我慢する。</a:t>
+            </a:r>
           </a:p>
         </p:txBody>
       </p:sp>
+      <p:pic>
+        <p:nvPicPr>
+          <p:cNvPr id="3" name="図 2">
+            <a:extLst>
+              <a:ext uri="{FF2B5EF4-FFF2-40B4-BE49-F238E27FC236}">
+                <a16:creationId xmlns:a16="http://schemas.microsoft.com/office/drawing/2014/main" id="{A89DCFE3-810B-4CD9-AD06-B4349274FD3C}"/>
+              </a:ext>
+            </a:extLst>
+          </p:cNvPr>
+          <p:cNvPicPr>
+            <a:picLocks noChangeAspect="1"/>
+          </p:cNvPicPr>
+          <p:nvPr/>
+        </p:nvPicPr>
+        <p:blipFill>
+          <a:blip r:embed="rId2"/>
+          <a:stretch>
+            <a:fillRect/>
+          </a:stretch>
+        </p:blipFill>
+        <p:spPr>
+          <a:xfrm>
+            <a:off x="7377214" y="2160931"/>
+            <a:ext cx="3791479" cy="2067213"/>
+          </a:xfrm>
+          <a:prstGeom prst="rect">
+            <a:avLst/>
+          </a:prstGeom>
+        </p:spPr>
+      </p:pic>
     </p:spTree>
     <p:extLst>
       <p:ext uri="{BB962C8B-B14F-4D97-AF65-F5344CB8AC3E}">
@@ -19551,7 +19599,7 @@
             </a:r>
             <a:r>
               <a:rPr kumimoji="1" lang="ja-JP" altLang="en-US" dirty="0"/>
-              <a:t>文はなかった</a:t>
+              <a:t>文はなかった。</a:t>
             </a:r>
           </a:p>
         </p:txBody>
@@ -19643,15 +19691,80 @@
             <p:ph type="body" idx="1"/>
           </p:nvPr>
         </p:nvSpPr>
-        <p:spPr/>
+        <p:spPr>
+          <a:xfrm>
+            <a:off x="838200" y="995423"/>
+            <a:ext cx="4378569" cy="5181540"/>
+          </a:xfrm>
+        </p:spPr>
         <p:txBody>
           <a:bodyPr/>
           <a:lstStyle/>
           <a:p>
-            <a:endParaRPr kumimoji="1" lang="ja-JP" altLang="en-US"/>
+            <a:r>
+              <a:rPr kumimoji="1" lang="ja-JP" altLang="en-US" dirty="0"/>
+              <a:t>置換で一気に変換する。</a:t>
+            </a:r>
+            <a:endParaRPr kumimoji="1" lang="en-US" altLang="ja-JP" dirty="0"/>
+          </a:p>
+          <a:p>
+            <a:endParaRPr lang="en-US" altLang="ja-JP" dirty="0"/>
+          </a:p>
+          <a:p>
+            <a:r>
+              <a:rPr kumimoji="1" lang="en-US" altLang="ja-JP" dirty="0"/>
+              <a:t>read(*,*)</a:t>
+            </a:r>
+            <a:r>
+              <a:rPr kumimoji="1" lang="ja-JP" altLang="en-US" dirty="0"/>
+              <a:t>も</a:t>
+            </a:r>
+            <a:r>
+              <a:rPr kumimoji="1" lang="en-US" altLang="ja-JP" dirty="0"/>
+              <a:t>read *,</a:t>
+            </a:r>
+            <a:r>
+              <a:rPr kumimoji="1" lang="ja-JP" altLang="en-US" dirty="0"/>
+              <a:t>に置き換えれるが、ここはローカルのルールに任せる</a:t>
+            </a:r>
+            <a:r>
+              <a:rPr lang="ja-JP" altLang="en-US" dirty="0"/>
+              <a:t>。</a:t>
+            </a:r>
+            <a:endParaRPr kumimoji="1" lang="en-US" altLang="ja-JP" dirty="0"/>
           </a:p>
         </p:txBody>
       </p:sp>
+      <p:pic>
+        <p:nvPicPr>
+          <p:cNvPr id="7" name="図 6">
+            <a:extLst>
+              <a:ext uri="{FF2B5EF4-FFF2-40B4-BE49-F238E27FC236}">
+                <a16:creationId xmlns:a16="http://schemas.microsoft.com/office/drawing/2014/main" id="{672E5366-504E-4A8D-BDDA-CC781ADD21E9}"/>
+              </a:ext>
+            </a:extLst>
+          </p:cNvPr>
+          <p:cNvPicPr>
+            <a:picLocks noChangeAspect="1"/>
+          </p:cNvPicPr>
+          <p:nvPr/>
+        </p:nvPicPr>
+        <p:blipFill>
+          <a:blip r:embed="rId2"/>
+          <a:stretch>
+            <a:fillRect/>
+          </a:stretch>
+        </p:blipFill>
+        <p:spPr>
+          <a:xfrm>
+            <a:off x="5382990" y="1395128"/>
+            <a:ext cx="6677957" cy="4067743"/>
+          </a:xfrm>
+          <a:prstGeom prst="rect">
+            <a:avLst/>
+          </a:prstGeom>
+        </p:spPr>
+      </p:pic>
     </p:spTree>
     <p:extLst>
       <p:ext uri="{BB962C8B-B14F-4D97-AF65-F5344CB8AC3E}">

</xml_diff>

<commit_message>
Replace GOTO in DO-loop to exit.
</commit_message>
<xml_diff>
--- a/ModernFortran.f10/20210724_リファクタリング.pptx
+++ b/ModernFortran.f10/20210724_リファクタリング.pptx
@@ -19826,7 +19826,7 @@
             </a:r>
             <a:r>
               <a:rPr kumimoji="1" lang="en-US" altLang="ja-JP" dirty="0"/>
-              <a:t>Do</a:t>
+              <a:t>do</a:t>
             </a:r>
             <a:r>
               <a:rPr kumimoji="1" lang="ja-JP" altLang="en-US" dirty="0"/>
@@ -19861,7 +19861,15 @@
           <a:bodyPr/>
           <a:lstStyle/>
           <a:p>
-            <a:endParaRPr kumimoji="1" lang="ja-JP" altLang="en-US"/>
+            <a:r>
+              <a:rPr kumimoji="1" lang="en-US" altLang="ja-JP" dirty="0"/>
+              <a:t>GOTO</a:t>
+            </a:r>
+            <a:r>
+              <a:rPr kumimoji="1" lang="ja-JP" altLang="en-US" dirty="0"/>
+              <a:t>ループはなかった。</a:t>
+            </a:r>
+            <a:endParaRPr kumimoji="1" lang="en-US" altLang="ja-JP" dirty="0"/>
           </a:p>
         </p:txBody>
       </p:sp>
@@ -19964,15 +19972,80 @@
             <p:ph type="body" idx="1"/>
           </p:nvPr>
         </p:nvSpPr>
-        <p:spPr/>
+        <p:spPr>
+          <a:xfrm>
+            <a:off x="838200" y="995423"/>
+            <a:ext cx="5843954" cy="5181540"/>
+          </a:xfrm>
+        </p:spPr>
         <p:txBody>
           <a:bodyPr/>
           <a:lstStyle/>
           <a:p>
-            <a:endParaRPr kumimoji="1" lang="ja-JP" altLang="en-US"/>
+            <a:r>
+              <a:rPr kumimoji="1" lang="en-US" altLang="ja-JP" dirty="0"/>
+              <a:t>go</a:t>
+            </a:r>
+            <a:r>
+              <a:rPr lang="ja-JP" altLang="en-US" dirty="0"/>
+              <a:t> </a:t>
+            </a:r>
+            <a:r>
+              <a:rPr kumimoji="1" lang="en-US" altLang="ja-JP" dirty="0"/>
+              <a:t>to</a:t>
+            </a:r>
+            <a:r>
+              <a:rPr kumimoji="1" lang="ja-JP" altLang="en-US" dirty="0"/>
+              <a:t>で抜けるループがあるので書き換える。</a:t>
+            </a:r>
+            <a:endParaRPr kumimoji="1" lang="en-US" altLang="ja-JP" dirty="0"/>
+          </a:p>
+          <a:p>
+            <a:endParaRPr lang="en-US" altLang="ja-JP" dirty="0"/>
+          </a:p>
+          <a:p>
+            <a:r>
+              <a:rPr lang="en-US" altLang="ja-JP" dirty="0"/>
+              <a:t>DO</a:t>
+            </a:r>
+            <a:r>
+              <a:rPr lang="ja-JP" altLang="en-US" dirty="0"/>
+              <a:t>文が文番号形式なので、それも後で書き換える。</a:t>
+            </a:r>
+            <a:endParaRPr lang="en-US" altLang="ja-JP" dirty="0"/>
           </a:p>
         </p:txBody>
       </p:sp>
+      <p:pic>
+        <p:nvPicPr>
+          <p:cNvPr id="5" name="図 4">
+            <a:extLst>
+              <a:ext uri="{FF2B5EF4-FFF2-40B4-BE49-F238E27FC236}">
+                <a16:creationId xmlns:a16="http://schemas.microsoft.com/office/drawing/2014/main" id="{24A48838-31CC-48A8-9575-90FEC9E14409}"/>
+              </a:ext>
+            </a:extLst>
+          </p:cNvPr>
+          <p:cNvPicPr>
+            <a:picLocks noChangeAspect="1"/>
+          </p:cNvPicPr>
+          <p:nvPr/>
+        </p:nvPicPr>
+        <p:blipFill>
+          <a:blip r:embed="rId2"/>
+          <a:stretch>
+            <a:fillRect/>
+          </a:stretch>
+        </p:blipFill>
+        <p:spPr>
+          <a:xfrm>
+            <a:off x="6876308" y="995424"/>
+            <a:ext cx="4248892" cy="2429026"/>
+          </a:xfrm>
+          <a:prstGeom prst="rect">
+            <a:avLst/>
+          </a:prstGeom>
+        </p:spPr>
+      </p:pic>
     </p:spTree>
     <p:extLst>
       <p:ext uri="{BB962C8B-B14F-4D97-AF65-F5344CB8AC3E}">
@@ -20080,7 +20153,23 @@
           <a:bodyPr/>
           <a:lstStyle/>
           <a:p>
-            <a:endParaRPr kumimoji="1" lang="ja-JP" altLang="en-US"/>
+            <a:r>
+              <a:rPr lang="en-US" altLang="ja-JP" dirty="0"/>
+              <a:t>if</a:t>
+            </a:r>
+            <a:r>
+              <a:rPr lang="ja-JP" altLang="en-US" dirty="0"/>
+              <a:t>文かました</a:t>
+            </a:r>
+            <a:r>
+              <a:rPr lang="en-US" altLang="ja-JP" dirty="0"/>
+              <a:t>GOTO</a:t>
+            </a:r>
+            <a:r>
+              <a:rPr lang="ja-JP" altLang="en-US" dirty="0"/>
+              <a:t>抜けはなかった。</a:t>
+            </a:r>
+            <a:endParaRPr kumimoji="1" lang="ja-JP" altLang="en-US" dirty="0"/>
           </a:p>
         </p:txBody>
       </p:sp>
@@ -20224,8 +20313,16 @@
           <a:lstStyle/>
           <a:p>
             <a:r>
-              <a:rPr kumimoji="1" lang="en-US" altLang="ja-JP" dirty="0" err="1"/>
-              <a:t>implicitnone</a:t>
+              <a:rPr kumimoji="1" lang="en-US" altLang="ja-JP" dirty="0"/>
+              <a:t>implicit</a:t>
+            </a:r>
+            <a:r>
+              <a:rPr lang="ja-JP" altLang="en-US" dirty="0"/>
+              <a:t> </a:t>
+            </a:r>
+            <a:r>
+              <a:rPr kumimoji="1" lang="en-US" altLang="ja-JP" dirty="0"/>
+              <a:t>none</a:t>
             </a:r>
             <a:r>
               <a:rPr kumimoji="1" lang="ja-JP" altLang="en-US" dirty="0"/>

</xml_diff>

<commit_message>
Added implicit none. Added type declaration.
</commit_message>
<xml_diff>
--- a/ModernFortran.f10/20210724_リファクタリング.pptx
+++ b/ModernFortran.f10/20210724_リファクタリング.pptx
@@ -45,12 +45,15 @@
     <p:sldId id="282" r:id="rId39"/>
     <p:sldId id="283" r:id="rId40"/>
     <p:sldId id="284" r:id="rId41"/>
-    <p:sldId id="285" r:id="rId42"/>
-    <p:sldId id="286" r:id="rId43"/>
-    <p:sldId id="287" r:id="rId44"/>
-    <p:sldId id="288" r:id="rId45"/>
-    <p:sldId id="289" r:id="rId46"/>
-    <p:sldId id="290" r:id="rId47"/>
+    <p:sldId id="303" r:id="rId42"/>
+    <p:sldId id="304" r:id="rId43"/>
+    <p:sldId id="285" r:id="rId44"/>
+    <p:sldId id="286" r:id="rId45"/>
+    <p:sldId id="287" r:id="rId46"/>
+    <p:sldId id="288" r:id="rId47"/>
+    <p:sldId id="289" r:id="rId48"/>
+    <p:sldId id="290" r:id="rId49"/>
+    <p:sldId id="305" r:id="rId50"/>
   </p:sldIdLst>
   <p:sldSz cx="12192000" cy="6858000"/>
   <p:notesSz cx="6858000" cy="9144000"/>
@@ -20304,7 +20307,28 @@
           <a:bodyPr/>
           <a:lstStyle/>
           <a:p>
-            <a:endParaRPr kumimoji="1" lang="ja-JP" altLang="en-US"/>
+            <a:r>
+              <a:rPr kumimoji="1" lang="ja-JP" altLang="en-US" dirty="0"/>
+              <a:t>ルーチンが長ければソースコードを分割することも考えるが今回短いので実施しない。</a:t>
+            </a:r>
+            <a:endParaRPr kumimoji="1" lang="en-US" altLang="ja-JP" dirty="0"/>
+          </a:p>
+          <a:p>
+            <a:endParaRPr lang="en-US" altLang="ja-JP" dirty="0"/>
+          </a:p>
+          <a:p>
+            <a:r>
+              <a:rPr kumimoji="1" lang="ja-JP" altLang="en-US" dirty="0"/>
+              <a:t>実施するとすれば、のちの改修内容によって、</a:t>
+            </a:r>
+            <a:r>
+              <a:rPr kumimoji="1" lang="en-US" altLang="ja-JP" dirty="0"/>
+              <a:t>I/O</a:t>
+            </a:r>
+            <a:r>
+              <a:rPr kumimoji="1" lang="ja-JP" altLang="en-US" dirty="0"/>
+              <a:t>部分やソルバ部分を切り出してもよいと思う。</a:t>
+            </a:r>
           </a:p>
         </p:txBody>
       </p:sp>
@@ -20399,15 +20423,73 @@
             <p:ph type="body" idx="1"/>
           </p:nvPr>
         </p:nvSpPr>
-        <p:spPr/>
+        <p:spPr>
+          <a:xfrm>
+            <a:off x="838200" y="995423"/>
+            <a:ext cx="5257800" cy="5181540"/>
+          </a:xfrm>
+        </p:spPr>
         <p:txBody>
           <a:bodyPr/>
           <a:lstStyle/>
           <a:p>
-            <a:endParaRPr kumimoji="1" lang="ja-JP" altLang="en-US"/>
+            <a:r>
+              <a:rPr kumimoji="1" lang="ja-JP" altLang="en-US" dirty="0"/>
+              <a:t>このコードも暗黙の型宣言をバリバリ使っている。</a:t>
+            </a:r>
+            <a:endParaRPr kumimoji="1" lang="en-US" altLang="ja-JP" dirty="0"/>
+          </a:p>
+          <a:p>
+            <a:endParaRPr lang="en-US" altLang="ja-JP" dirty="0"/>
+          </a:p>
+          <a:p>
+            <a:r>
+              <a:rPr kumimoji="1" lang="ja-JP" altLang="en-US" dirty="0"/>
+              <a:t>追記するとエラーの山</a:t>
+            </a:r>
+            <a:endParaRPr kumimoji="1" lang="en-US" altLang="ja-JP" dirty="0"/>
+          </a:p>
+          <a:p>
+            <a:endParaRPr lang="en-US" altLang="ja-JP" dirty="0"/>
+          </a:p>
+          <a:p>
+            <a:r>
+              <a:rPr kumimoji="1" lang="ja-JP" altLang="en-US" dirty="0"/>
+              <a:t>手間はかかるがしっかりと型宣言を書き、変数の管理を行う。</a:t>
+            </a:r>
           </a:p>
         </p:txBody>
       </p:sp>
+      <p:pic>
+        <p:nvPicPr>
+          <p:cNvPr id="5" name="図 4">
+            <a:extLst>
+              <a:ext uri="{FF2B5EF4-FFF2-40B4-BE49-F238E27FC236}">
+                <a16:creationId xmlns:a16="http://schemas.microsoft.com/office/drawing/2014/main" id="{F5A38C79-468E-467C-9FB4-72A75B4B259E}"/>
+              </a:ext>
+            </a:extLst>
+          </p:cNvPr>
+          <p:cNvPicPr>
+            <a:picLocks noChangeAspect="1"/>
+          </p:cNvPicPr>
+          <p:nvPr/>
+        </p:nvPicPr>
+        <p:blipFill>
+          <a:blip r:embed="rId2"/>
+          <a:stretch>
+            <a:fillRect/>
+          </a:stretch>
+        </p:blipFill>
+        <p:spPr>
+          <a:xfrm>
+            <a:off x="5990492" y="1133155"/>
+            <a:ext cx="6201508" cy="4105944"/>
+          </a:xfrm>
+          <a:prstGeom prst="rect">
+            <a:avLst/>
+          </a:prstGeom>
+        </p:spPr>
+      </p:pic>
     </p:spTree>
     <p:extLst>
       <p:ext uri="{BB962C8B-B14F-4D97-AF65-F5344CB8AC3E}">
@@ -20492,7 +20574,18 @@
           <a:bodyPr/>
           <a:lstStyle/>
           <a:p>
-            <a:endParaRPr kumimoji="1" lang="ja-JP" altLang="en-US"/>
+            <a:r>
+              <a:rPr kumimoji="1" lang="ja-JP" altLang="en-US" dirty="0"/>
+              <a:t>今回は型宣言がないので、書き直しはないが、改めて</a:t>
+            </a:r>
+            <a:r>
+              <a:rPr kumimoji="1" lang="en-US" altLang="ja-JP" dirty="0"/>
+              <a:t>real*4</a:t>
+            </a:r>
+            <a:r>
+              <a:rPr kumimoji="1" lang="ja-JP" altLang="en-US" dirty="0"/>
+              <a:t>とか書かないように気を付ける。</a:t>
+            </a:r>
           </a:p>
         </p:txBody>
       </p:sp>
@@ -21419,7 +21512,20 @@
           <a:bodyPr/>
           <a:lstStyle/>
           <a:p>
-            <a:endParaRPr kumimoji="1" lang="ja-JP" altLang="en-US"/>
+            <a:r>
+              <a:rPr kumimoji="1" lang="ja-JP" altLang="en-US" dirty="0"/>
+              <a:t>このスライドで代用する。</a:t>
+            </a:r>
+            <a:endParaRPr kumimoji="1" lang="en-US" altLang="ja-JP" dirty="0"/>
+          </a:p>
+          <a:p>
+            <a:endParaRPr lang="en-US" altLang="ja-JP" dirty="0"/>
+          </a:p>
+          <a:p>
+            <a:r>
+              <a:rPr kumimoji="1" lang="ja-JP" altLang="en-US" dirty="0"/>
+              <a:t>リファクタリングはどこかで計算結果が変わったりするので、やったことは残すようにした方がよい。</a:t>
+            </a:r>
           </a:p>
         </p:txBody>
       </p:sp>
@@ -21458,6 +21564,247 @@
           <p:cNvPr id="2" name="タイトル 1">
             <a:extLst>
               <a:ext uri="{FF2B5EF4-FFF2-40B4-BE49-F238E27FC236}">
+                <a16:creationId xmlns:a16="http://schemas.microsoft.com/office/drawing/2014/main" id="{7FE1035E-40A8-48C3-BF6E-2D888B07C82E}"/>
+              </a:ext>
+            </a:extLst>
+          </p:cNvPr>
+          <p:cNvSpPr>
+            <a:spLocks noGrp="1"/>
+          </p:cNvSpPr>
+          <p:nvPr>
+            <p:ph type="title"/>
+          </p:nvPr>
+        </p:nvSpPr>
+        <p:spPr/>
+        <p:txBody>
+          <a:bodyPr/>
+          <a:lstStyle/>
+          <a:p>
+            <a:r>
+              <a:rPr lang="ja-JP" altLang="en-US" dirty="0"/>
+              <a:t>やり残しを直す</a:t>
+            </a:r>
+            <a:endParaRPr kumimoji="1" lang="ja-JP" altLang="en-US" dirty="0"/>
+          </a:p>
+        </p:txBody>
+      </p:sp>
+      <p:sp>
+        <p:nvSpPr>
+          <p:cNvPr id="3" name="テキスト プレースホルダー 2">
+            <a:extLst>
+              <a:ext uri="{FF2B5EF4-FFF2-40B4-BE49-F238E27FC236}">
+                <a16:creationId xmlns:a16="http://schemas.microsoft.com/office/drawing/2014/main" id="{4385BEA0-6856-4DEC-8E66-EE44A28E4274}"/>
+              </a:ext>
+            </a:extLst>
+          </p:cNvPr>
+          <p:cNvSpPr>
+            <a:spLocks noGrp="1"/>
+          </p:cNvSpPr>
+          <p:nvPr>
+            <p:ph type="body" idx="1"/>
+          </p:nvPr>
+        </p:nvSpPr>
+        <p:spPr/>
+        <p:txBody>
+          <a:bodyPr/>
+          <a:lstStyle/>
+          <a:p>
+            <a:r>
+              <a:rPr kumimoji="1" lang="en-US" altLang="ja-JP" dirty="0"/>
+              <a:t>SUBROUTINE</a:t>
+            </a:r>
+            <a:r>
+              <a:rPr kumimoji="1" lang="ja-JP" altLang="en-US" dirty="0"/>
+              <a:t>文を直し忘れていたので直す。</a:t>
+            </a:r>
+            <a:endParaRPr kumimoji="1" lang="en-US" altLang="ja-JP" dirty="0"/>
+          </a:p>
+          <a:p>
+            <a:endParaRPr lang="en-US" altLang="ja-JP" dirty="0"/>
+          </a:p>
+          <a:p>
+            <a:r>
+              <a:rPr lang="ja-JP" altLang="en-US" dirty="0"/>
+              <a:t>インデックスずれを直す。</a:t>
+            </a:r>
+            <a:endParaRPr lang="en-US" altLang="ja-JP" dirty="0"/>
+          </a:p>
+          <a:p>
+            <a:endParaRPr lang="en-US" altLang="ja-JP" dirty="0"/>
+          </a:p>
+          <a:p>
+            <a:r>
+              <a:rPr lang="ja-JP" altLang="en-US" dirty="0"/>
+              <a:t>コメント文をＣから！に直す</a:t>
+            </a:r>
+            <a:endParaRPr lang="en-US" altLang="ja-JP" dirty="0"/>
+          </a:p>
+          <a:p>
+            <a:endParaRPr lang="en-US" altLang="ja-JP" dirty="0"/>
+          </a:p>
+          <a:p>
+            <a:r>
+              <a:rPr lang="ja-JP" altLang="en-US" dirty="0"/>
+              <a:t>ファイル拡張子を</a:t>
+            </a:r>
+            <a:r>
+              <a:rPr lang="en-US" altLang="ja-JP" dirty="0"/>
+              <a:t>f90</a:t>
+            </a:r>
+            <a:r>
+              <a:rPr lang="ja-JP" altLang="en-US" dirty="0"/>
+              <a:t>にする</a:t>
+            </a:r>
+            <a:endParaRPr lang="en-US" altLang="ja-JP" dirty="0"/>
+          </a:p>
+          <a:p>
+            <a:endParaRPr kumimoji="1" lang="ja-JP" altLang="en-US" dirty="0"/>
+          </a:p>
+        </p:txBody>
+      </p:sp>
+    </p:spTree>
+    <p:extLst>
+      <p:ext uri="{BB962C8B-B14F-4D97-AF65-F5344CB8AC3E}">
+        <p14:creationId xmlns:p14="http://schemas.microsoft.com/office/powerpoint/2010/main" val="824815064"/>
+      </p:ext>
+    </p:extLst>
+  </p:cSld>
+  <p:clrMapOvr>
+    <a:masterClrMapping/>
+  </p:clrMapOvr>
+</p:sld>
+</file>
+
+<file path=ppt/slides/slide42.xml><?xml version="1.0" encoding="utf-8"?>
+<p:sld xmlns:a="http://schemas.openxmlformats.org/drawingml/2006/main" xmlns:r="http://schemas.openxmlformats.org/officeDocument/2006/relationships" xmlns:p="http://schemas.openxmlformats.org/presentationml/2006/main">
+  <p:cSld>
+    <p:spTree>
+      <p:nvGrpSpPr>
+        <p:cNvPr id="1" name=""/>
+        <p:cNvGrpSpPr/>
+        <p:nvPr/>
+      </p:nvGrpSpPr>
+      <p:grpSpPr>
+        <a:xfrm>
+          <a:off x="0" y="0"/>
+          <a:ext cx="0" cy="0"/>
+          <a:chOff x="0" y="0"/>
+          <a:chExt cx="0" cy="0"/>
+        </a:xfrm>
+      </p:grpSpPr>
+      <p:sp>
+        <p:nvSpPr>
+          <p:cNvPr id="2" name="タイトル 1">
+            <a:extLst>
+              <a:ext uri="{FF2B5EF4-FFF2-40B4-BE49-F238E27FC236}">
+                <a16:creationId xmlns:a16="http://schemas.microsoft.com/office/drawing/2014/main" id="{EBC715BC-D415-48DB-A735-769BB9DB15E0}"/>
+              </a:ext>
+            </a:extLst>
+          </p:cNvPr>
+          <p:cNvSpPr>
+            <a:spLocks noGrp="1"/>
+          </p:cNvSpPr>
+          <p:nvPr>
+            <p:ph type="title"/>
+          </p:nvPr>
+        </p:nvSpPr>
+        <p:spPr/>
+        <p:txBody>
+          <a:bodyPr/>
+          <a:lstStyle/>
+          <a:p>
+            <a:r>
+              <a:rPr kumimoji="1" lang="ja-JP" altLang="en-US" dirty="0"/>
+              <a:t>作業編のまとめ</a:t>
+            </a:r>
+          </a:p>
+        </p:txBody>
+      </p:sp>
+      <p:sp>
+        <p:nvSpPr>
+          <p:cNvPr id="3" name="テキスト プレースホルダー 2">
+            <a:extLst>
+              <a:ext uri="{FF2B5EF4-FFF2-40B4-BE49-F238E27FC236}">
+                <a16:creationId xmlns:a16="http://schemas.microsoft.com/office/drawing/2014/main" id="{4C86CF25-C1E3-4D5E-B1B0-B44F7BD94BFA}"/>
+              </a:ext>
+            </a:extLst>
+          </p:cNvPr>
+          <p:cNvSpPr>
+            <a:spLocks noGrp="1"/>
+          </p:cNvSpPr>
+          <p:nvPr>
+            <p:ph type="body" idx="1"/>
+          </p:nvPr>
+        </p:nvSpPr>
+        <p:spPr/>
+        <p:txBody>
+          <a:bodyPr/>
+          <a:lstStyle/>
+          <a:p>
+            <a:r>
+              <a:rPr kumimoji="1" lang="ja-JP" altLang="en-US" dirty="0"/>
+              <a:t>最初のプログラムよりも大分モダンっぽく（</a:t>
+            </a:r>
+            <a:r>
+              <a:rPr kumimoji="1" lang="en-US" altLang="ja-JP" dirty="0"/>
+              <a:t>f90</a:t>
+            </a:r>
+            <a:r>
+              <a:rPr kumimoji="1" lang="ja-JP" altLang="en-US" dirty="0"/>
+              <a:t>くらいに）なった。</a:t>
+            </a:r>
+            <a:endParaRPr kumimoji="1" lang="en-US" altLang="ja-JP" dirty="0"/>
+          </a:p>
+          <a:p>
+            <a:endParaRPr lang="en-US" altLang="ja-JP" dirty="0"/>
+          </a:p>
+          <a:p>
+            <a:r>
+              <a:rPr kumimoji="1" lang="en-US" altLang="ja-JP" dirty="0"/>
+              <a:t>Python</a:t>
+            </a:r>
+            <a:r>
+              <a:rPr kumimoji="1" lang="ja-JP" altLang="en-US" dirty="0"/>
+              <a:t>等がはやっている今の世の中的には大文字プログラムはなれという意味で読みにくい部分があるのではないかと改めて思う。</a:t>
+            </a:r>
+          </a:p>
+        </p:txBody>
+      </p:sp>
+    </p:spTree>
+    <p:extLst>
+      <p:ext uri="{BB962C8B-B14F-4D97-AF65-F5344CB8AC3E}">
+        <p14:creationId xmlns:p14="http://schemas.microsoft.com/office/powerpoint/2010/main" val="2949101180"/>
+      </p:ext>
+    </p:extLst>
+  </p:cSld>
+  <p:clrMapOvr>
+    <a:masterClrMapping/>
+  </p:clrMapOvr>
+</p:sld>
+</file>
+
+<file path=ppt/slides/slide43.xml><?xml version="1.0" encoding="utf-8"?>
+<p:sld xmlns:a="http://schemas.openxmlformats.org/drawingml/2006/main" xmlns:r="http://schemas.openxmlformats.org/officeDocument/2006/relationships" xmlns:p="http://schemas.openxmlformats.org/presentationml/2006/main">
+  <p:cSld>
+    <p:spTree>
+      <p:nvGrpSpPr>
+        <p:cNvPr id="1" name=""/>
+        <p:cNvGrpSpPr/>
+        <p:nvPr/>
+      </p:nvGrpSpPr>
+      <p:grpSpPr>
+        <a:xfrm>
+          <a:off x="0" y="0"/>
+          <a:ext cx="0" cy="0"/>
+          <a:chOff x="0" y="0"/>
+          <a:chExt cx="0" cy="0"/>
+        </a:xfrm>
+      </p:grpSpPr>
+      <p:sp>
+        <p:nvSpPr>
+          <p:cNvPr id="2" name="タイトル 1">
+            <a:extLst>
+              <a:ext uri="{FF2B5EF4-FFF2-40B4-BE49-F238E27FC236}">
                 <a16:creationId xmlns:a16="http://schemas.microsoft.com/office/drawing/2014/main" id="{B6FFD372-B15D-4DC7-AC74-6F49A85799B3}"/>
               </a:ext>
             </a:extLst>
@@ -21519,7 +21866,7 @@
 </p:sld>
 </file>
 
-<file path=ppt/slides/slide42.xml><?xml version="1.0" encoding="utf-8"?>
+<file path=ppt/slides/slide44.xml><?xml version="1.0" encoding="utf-8"?>
 <p:sld xmlns:a="http://schemas.openxmlformats.org/drawingml/2006/main" xmlns:r="http://schemas.openxmlformats.org/officeDocument/2006/relationships" xmlns:p="http://schemas.openxmlformats.org/presentationml/2006/main">
   <p:cSld>
     <p:spTree>
@@ -21590,7 +21937,7 @@
           <a:bodyPr/>
           <a:lstStyle/>
           <a:p>
-            <a:endParaRPr kumimoji="1" lang="ja-JP" altLang="en-US"/>
+            <a:endParaRPr kumimoji="1" lang="ja-JP" altLang="en-US" dirty="0"/>
           </a:p>
         </p:txBody>
       </p:sp>
@@ -21607,7 +21954,7 @@
 </p:sld>
 </file>
 
-<file path=ppt/slides/slide43.xml><?xml version="1.0" encoding="utf-8"?>
+<file path=ppt/slides/slide45.xml><?xml version="1.0" encoding="utf-8"?>
 <p:sld xmlns:a="http://schemas.openxmlformats.org/drawingml/2006/main" xmlns:r="http://schemas.openxmlformats.org/officeDocument/2006/relationships" xmlns:p="http://schemas.openxmlformats.org/presentationml/2006/main">
   <p:cSld>
     <p:spTree>
@@ -21682,7 +22029,19 @@
           <a:bodyPr/>
           <a:lstStyle/>
           <a:p>
-            <a:endParaRPr kumimoji="1" lang="ja-JP" altLang="en-US"/>
+            <a:r>
+              <a:rPr kumimoji="1" lang="ja-JP" altLang="en-US" dirty="0"/>
+              <a:t>今回は省略するが、</a:t>
+            </a:r>
+            <a:r>
+              <a:rPr kumimoji="1" lang="en-US" altLang="ja-JP" dirty="0"/>
+              <a:t>CUI</a:t>
+            </a:r>
+            <a:r>
+              <a:rPr lang="ja-JP" altLang="en-US" dirty="0"/>
+              <a:t>に数字で流体計算の結果出力は今はあまりやらないので、画像出力などを検討してもよいと思う。</a:t>
+            </a:r>
+            <a:endParaRPr kumimoji="1" lang="ja-JP" altLang="en-US" dirty="0"/>
           </a:p>
         </p:txBody>
       </p:sp>
@@ -21699,7 +22058,7 @@
 </p:sld>
 </file>
 
-<file path=ppt/slides/slide44.xml><?xml version="1.0" encoding="utf-8"?>
+<file path=ppt/slides/slide46.xml><?xml version="1.0" encoding="utf-8"?>
 <p:sld xmlns:a="http://schemas.openxmlformats.org/drawingml/2006/main" xmlns:r="http://schemas.openxmlformats.org/officeDocument/2006/relationships" xmlns:p="http://schemas.openxmlformats.org/presentationml/2006/main">
   <p:cSld>
     <p:spTree>
@@ -21798,7 +22157,7 @@
 </p:sld>
 </file>
 
-<file path=ppt/slides/slide45.xml><?xml version="1.0" encoding="utf-8"?>
+<file path=ppt/slides/slide47.xml><?xml version="1.0" encoding="utf-8"?>
 <p:sld xmlns:a="http://schemas.openxmlformats.org/drawingml/2006/main" xmlns:r="http://schemas.openxmlformats.org/officeDocument/2006/relationships" xmlns:p="http://schemas.openxmlformats.org/presentationml/2006/main">
   <p:cSld>
     <p:spTree>
@@ -21869,7 +22228,10 @@
           <a:bodyPr/>
           <a:lstStyle/>
           <a:p>
-            <a:endParaRPr kumimoji="1" lang="ja-JP" altLang="en-US" dirty="0"/>
+            <a:r>
+              <a:rPr kumimoji="1" lang="ja-JP" altLang="en-US" dirty="0"/>
+              <a:t>今回はサブルーチンが長くないので、省略する。</a:t>
+            </a:r>
           </a:p>
         </p:txBody>
       </p:sp>
@@ -21886,7 +22248,7 @@
 </p:sld>
 </file>
 
-<file path=ppt/slides/slide46.xml><?xml version="1.0" encoding="utf-8"?>
+<file path=ppt/slides/slide48.xml><?xml version="1.0" encoding="utf-8"?>
 <p:sld xmlns:a="http://schemas.openxmlformats.org/drawingml/2006/main" xmlns:r="http://schemas.openxmlformats.org/officeDocument/2006/relationships" xmlns:p="http://schemas.openxmlformats.org/presentationml/2006/main">
   <p:cSld>
     <p:spTree>
@@ -21973,6 +22335,16 @@
           </a:p>
           <a:p>
             <a:r>
+              <a:rPr lang="ja-JP" altLang="en-US" dirty="0"/>
+              <a:t>やってみるといくつか追記したい部分（暗黙的にやっている部分）もあった</a:t>
+            </a:r>
+            <a:endParaRPr lang="en-US" altLang="ja-JP" dirty="0"/>
+          </a:p>
+          <a:p>
+            <a:endParaRPr lang="en-US" altLang="ja-JP" dirty="0"/>
+          </a:p>
+          <a:p>
+            <a:r>
               <a:rPr kumimoji="1" lang="ja-JP" altLang="en-US" dirty="0"/>
               <a:t>今後はもう少しリファクタリング本を追記して、リファクタリングを軸にした入門書にしていきたい</a:t>
             </a:r>
@@ -21984,6 +22356,89 @@
     <p:extLst>
       <p:ext uri="{BB962C8B-B14F-4D97-AF65-F5344CB8AC3E}">
         <p14:creationId xmlns:p14="http://schemas.microsoft.com/office/powerpoint/2010/main" val="2209093425"/>
+      </p:ext>
+    </p:extLst>
+  </p:cSld>
+  <p:clrMapOvr>
+    <a:masterClrMapping/>
+  </p:clrMapOvr>
+</p:sld>
+</file>
+
+<file path=ppt/slides/slide49.xml><?xml version="1.0" encoding="utf-8"?>
+<p:sld xmlns:a="http://schemas.openxmlformats.org/drawingml/2006/main" xmlns:r="http://schemas.openxmlformats.org/officeDocument/2006/relationships" xmlns:p="http://schemas.openxmlformats.org/presentationml/2006/main">
+  <p:cSld>
+    <p:spTree>
+      <p:nvGrpSpPr>
+        <p:cNvPr id="1" name=""/>
+        <p:cNvGrpSpPr/>
+        <p:nvPr/>
+      </p:nvGrpSpPr>
+      <p:grpSpPr>
+        <a:xfrm>
+          <a:off x="0" y="0"/>
+          <a:ext cx="0" cy="0"/>
+          <a:chOff x="0" y="0"/>
+          <a:chExt cx="0" cy="0"/>
+        </a:xfrm>
+      </p:grpSpPr>
+      <p:sp>
+        <p:nvSpPr>
+          <p:cNvPr id="4" name="タイトル 3">
+            <a:extLst>
+              <a:ext uri="{FF2B5EF4-FFF2-40B4-BE49-F238E27FC236}">
+                <a16:creationId xmlns:a16="http://schemas.microsoft.com/office/drawing/2014/main" id="{8C853FD3-ADA7-4EA4-9987-8C379D1A3730}"/>
+              </a:ext>
+            </a:extLst>
+          </p:cNvPr>
+          <p:cNvSpPr>
+            <a:spLocks noGrp="1"/>
+          </p:cNvSpPr>
+          <p:nvPr>
+            <p:ph type="ctrTitle"/>
+          </p:nvPr>
+        </p:nvSpPr>
+        <p:spPr/>
+        <p:txBody>
+          <a:bodyPr/>
+          <a:lstStyle/>
+          <a:p>
+            <a:r>
+              <a:rPr lang="ja-JP" altLang="en-US" dirty="0"/>
+              <a:t>ご清聴ありがとうございました</a:t>
+            </a:r>
+          </a:p>
+        </p:txBody>
+      </p:sp>
+      <p:sp>
+        <p:nvSpPr>
+          <p:cNvPr id="5" name="字幕 4">
+            <a:extLst>
+              <a:ext uri="{FF2B5EF4-FFF2-40B4-BE49-F238E27FC236}">
+                <a16:creationId xmlns:a16="http://schemas.microsoft.com/office/drawing/2014/main" id="{13661A32-0EAC-485E-AF77-EC6223F4C99E}"/>
+              </a:ext>
+            </a:extLst>
+          </p:cNvPr>
+          <p:cNvSpPr>
+            <a:spLocks noGrp="1"/>
+          </p:cNvSpPr>
+          <p:nvPr>
+            <p:ph type="subTitle" idx="1"/>
+          </p:nvPr>
+        </p:nvSpPr>
+        <p:spPr/>
+        <p:txBody>
+          <a:bodyPr/>
+          <a:lstStyle/>
+          <a:p>
+            <a:endParaRPr lang="ja-JP" altLang="en-US"/>
+          </a:p>
+        </p:txBody>
+      </p:sp>
+    </p:spTree>
+    <p:extLst>
+      <p:ext uri="{BB962C8B-B14F-4D97-AF65-F5344CB8AC3E}">
+        <p14:creationId xmlns:p14="http://schemas.microsoft.com/office/powerpoint/2010/main" val="2649589006"/>
       </p:ext>
     </p:extLst>
   </p:cSld>

</xml_diff>

<commit_message>
Make the conditional expression lowercase.
</commit_message>
<xml_diff>
--- a/ModernFortran.f10/20210724_リファクタリング.pptx
+++ b/ModernFortran.f10/20210724_リファクタリング.pptx
@@ -21624,38 +21624,64 @@
           </a:p>
           <a:p>
             <a:r>
-              <a:rPr lang="ja-JP" altLang="en-US" dirty="0"/>
+              <a:rPr kumimoji="1" lang="ja-JP" altLang="en-US" dirty="0"/>
+              <a:t>コメント文をＣから！に直す。</a:t>
+            </a:r>
+          </a:p>
+          <a:p>
+            <a:endParaRPr kumimoji="1" lang="ja-JP" altLang="en-US" dirty="0"/>
+          </a:p>
+          <a:p>
+            <a:r>
+              <a:rPr kumimoji="1" lang="ja-JP" altLang="en-US" dirty="0"/>
+              <a:t>拡張子を</a:t>
+            </a:r>
+            <a:r>
+              <a:rPr kumimoji="1" lang="en-US" altLang="ja-JP" dirty="0"/>
+              <a:t>f90</a:t>
+            </a:r>
+            <a:r>
+              <a:rPr kumimoji="1" lang="ja-JP" altLang="en-US" dirty="0"/>
+              <a:t>にする。</a:t>
+            </a:r>
+          </a:p>
+          <a:p>
+            <a:endParaRPr kumimoji="1" lang="ja-JP" altLang="en-US" dirty="0"/>
+          </a:p>
+          <a:p>
+            <a:r>
+              <a:rPr kumimoji="1" lang="ja-JP" altLang="en-US" dirty="0"/>
+              <a:t>改行を書き直す</a:t>
+            </a:r>
+          </a:p>
+          <a:p>
+            <a:endParaRPr kumimoji="1" lang="ja-JP" altLang="en-US" dirty="0"/>
+          </a:p>
+          <a:p>
+            <a:r>
+              <a:rPr kumimoji="1" lang="ja-JP" altLang="en-US" dirty="0"/>
               <a:t>インデックスずれを直す。</a:t>
             </a:r>
+          </a:p>
+          <a:p>
+            <a:endParaRPr kumimoji="1" lang="ja-JP" altLang="en-US" dirty="0"/>
+          </a:p>
+          <a:p>
+            <a:r>
+              <a:rPr kumimoji="1" lang="ja-JP" altLang="en-US" dirty="0"/>
+              <a:t>空白行やスペースなどを適宜入れて調整する。</a:t>
+            </a:r>
+            <a:endParaRPr kumimoji="1" lang="en-US" altLang="ja-JP" dirty="0"/>
+          </a:p>
+          <a:p>
             <a:endParaRPr lang="en-US" altLang="ja-JP" dirty="0"/>
           </a:p>
           <a:p>
-            <a:endParaRPr lang="en-US" altLang="ja-JP" dirty="0"/>
-          </a:p>
-          <a:p>
-            <a:r>
-              <a:rPr lang="ja-JP" altLang="en-US" dirty="0"/>
-              <a:t>コメント文をＣから！に直す</a:t>
-            </a:r>
-            <a:endParaRPr lang="en-US" altLang="ja-JP" dirty="0"/>
-          </a:p>
-          <a:p>
-            <a:endParaRPr lang="en-US" altLang="ja-JP" dirty="0"/>
-          </a:p>
-          <a:p>
-            <a:r>
-              <a:rPr lang="ja-JP" altLang="en-US" dirty="0"/>
-              <a:t>ファイル拡張子を</a:t>
-            </a:r>
-            <a:r>
-              <a:rPr lang="en-US" altLang="ja-JP" dirty="0"/>
-              <a:t>f90</a:t>
-            </a:r>
-            <a:r>
-              <a:rPr lang="ja-JP" altLang="en-US" dirty="0"/>
-              <a:t>にする</a:t>
-            </a:r>
-            <a:endParaRPr lang="en-US" altLang="ja-JP" dirty="0"/>
+            <a:r>
+              <a:rPr kumimoji="1" lang="ja-JP" altLang="en-US"/>
+              <a:t>条件式が大文字のままだったので直す。</a:t>
+            </a:r>
+            <a:endParaRPr kumimoji="1" lang="ja-JP" altLang="en-US" dirty="0"/>
           </a:p>
           <a:p>
             <a:endParaRPr kumimoji="1" lang="ja-JP" altLang="en-US" dirty="0"/>
@@ -21937,6 +21963,62 @@
           <a:bodyPr/>
           <a:lstStyle/>
           <a:p>
+            <a:r>
+              <a:rPr kumimoji="1" lang="en-US" altLang="ja-JP" dirty="0"/>
+              <a:t>OMG</a:t>
+            </a:r>
+            <a:r>
+              <a:rPr kumimoji="1" lang="ja-JP" altLang="en-US" dirty="0"/>
+              <a:t>→</a:t>
+            </a:r>
+            <a:r>
+              <a:rPr lang="en-US" altLang="ja-JP" dirty="0"/>
+              <a:t>OMEGA</a:t>
+            </a:r>
+            <a:r>
+              <a:rPr lang="ja-JP" altLang="en-US" dirty="0"/>
+              <a:t>、</a:t>
+            </a:r>
+            <a:r>
+              <a:rPr lang="en-US" altLang="ja-JP" dirty="0"/>
+              <a:t>TMP→TEMPORARY</a:t>
+            </a:r>
+            <a:r>
+              <a:rPr lang="ja-JP" altLang="en-US" dirty="0"/>
+              <a:t>、</a:t>
+            </a:r>
+            <a:r>
+              <a:rPr lang="en-US" altLang="ja-JP" dirty="0"/>
+              <a:t>EPS</a:t>
+            </a:r>
+            <a:r>
+              <a:rPr lang="ja-JP" altLang="en-US" dirty="0"/>
+              <a:t>→</a:t>
+            </a:r>
+            <a:r>
+              <a:rPr lang="en-US" altLang="ja-JP" b="0" i="0" dirty="0">
+                <a:solidFill>
+                  <a:srgbClr val="202122"/>
+                </a:solidFill>
+                <a:effectLst/>
+                <a:latin typeface="Arial" panose="020B0604020202020204" pitchFamily="34" charset="0"/>
+              </a:rPr>
+              <a:t>EPSILON</a:t>
+            </a:r>
+            <a:r>
+              <a:rPr lang="ja-JP" altLang="en-US" dirty="0"/>
+              <a:t>にする。</a:t>
+            </a:r>
+            <a:endParaRPr lang="en-US" altLang="ja-JP" dirty="0"/>
+          </a:p>
+          <a:p>
+            <a:endParaRPr kumimoji="1" lang="en-US" altLang="ja-JP" dirty="0"/>
+          </a:p>
+          <a:p>
+            <a:r>
+              <a:rPr lang="ja-JP" altLang="en-US" dirty="0"/>
+              <a:t>無茶苦茶に略している変数名がないのでこの程度にしておく。</a:t>
+            </a:r>
             <a:endParaRPr kumimoji="1" lang="ja-JP" altLang="en-US" dirty="0"/>
           </a:p>
         </p:txBody>
@@ -22230,8 +22312,13 @@
           <a:p>
             <a:r>
               <a:rPr kumimoji="1" lang="ja-JP" altLang="en-US" dirty="0"/>
-              <a:t>今回はサブルーチンが長くないので、省略する。</a:t>
-            </a:r>
+              <a:t>今回はそこまで長くもややこしくもないので省略</a:t>
+            </a:r>
+            <a:r>
+              <a:rPr lang="ja-JP" altLang="en-US" dirty="0"/>
+              <a:t>する。</a:t>
+            </a:r>
+            <a:endParaRPr kumimoji="1" lang="ja-JP" altLang="en-US" dirty="0"/>
           </a:p>
         </p:txBody>
       </p:sp>

</xml_diff>